<commit_message>
attempting to remove large file
</commit_message>
<xml_diff>
--- a/cells.pptx
+++ b/cells.pptx
@@ -4,22 +4,26 @@
   <p:sldMasterIdLst>
     <p:sldMasterId id="2147483648" r:id="rId1"/>
   </p:sldMasterIdLst>
+  <p:notesMasterIdLst>
+    <p:notesMasterId r:id="rId18"/>
+  </p:notesMasterIdLst>
   <p:sldIdLst>
     <p:sldId id="256" r:id="rId2"/>
     <p:sldId id="257" r:id="rId3"/>
     <p:sldId id="258" r:id="rId4"/>
-    <p:sldId id="259" r:id="rId5"/>
-    <p:sldId id="260" r:id="rId6"/>
-    <p:sldId id="261" r:id="rId7"/>
-    <p:sldId id="262" r:id="rId8"/>
-    <p:sldId id="263" r:id="rId9"/>
-    <p:sldId id="264" r:id="rId10"/>
-    <p:sldId id="265" r:id="rId11"/>
-    <p:sldId id="266" r:id="rId12"/>
-    <p:sldId id="267" r:id="rId13"/>
-    <p:sldId id="268" r:id="rId14"/>
-    <p:sldId id="269" r:id="rId15"/>
-    <p:sldId id="270" r:id="rId16"/>
+    <p:sldId id="271" r:id="rId5"/>
+    <p:sldId id="259" r:id="rId6"/>
+    <p:sldId id="260" r:id="rId7"/>
+    <p:sldId id="261" r:id="rId8"/>
+    <p:sldId id="262" r:id="rId9"/>
+    <p:sldId id="263" r:id="rId10"/>
+    <p:sldId id="264" r:id="rId11"/>
+    <p:sldId id="265" r:id="rId12"/>
+    <p:sldId id="266" r:id="rId13"/>
+    <p:sldId id="267" r:id="rId14"/>
+    <p:sldId id="268" r:id="rId15"/>
+    <p:sldId id="269" r:id="rId16"/>
+    <p:sldId id="270" r:id="rId17"/>
   </p:sldIdLst>
   <p:sldSz cx="12192000" cy="6858000"/>
   <p:notesSz cx="6858000" cy="9144000"/>
@@ -219,6 +223,613 @@
 </pc:chgInfo>
 </file>
 
+<file path=ppt/notesMasters/notesMaster1.xml><?xml version="1.0" encoding="utf-8"?>
+<p:notesMaster xmlns:a="http://schemas.openxmlformats.org/drawingml/2006/main" xmlns:r="http://schemas.openxmlformats.org/officeDocument/2006/relationships" xmlns:p="http://schemas.openxmlformats.org/presentationml/2006/main">
+  <p:cSld>
+    <p:bg>
+      <p:bgRef idx="1001">
+        <a:schemeClr val="bg1"/>
+      </p:bgRef>
+    </p:bg>
+    <p:spTree>
+      <p:nvGrpSpPr>
+        <p:cNvPr id="1" name=""/>
+        <p:cNvGrpSpPr/>
+        <p:nvPr/>
+      </p:nvGrpSpPr>
+      <p:grpSpPr>
+        <a:xfrm>
+          <a:off x="0" y="0"/>
+          <a:ext cx="0" cy="0"/>
+          <a:chOff x="0" y="0"/>
+          <a:chExt cx="0" cy="0"/>
+        </a:xfrm>
+      </p:grpSpPr>
+      <p:sp>
+        <p:nvSpPr>
+          <p:cNvPr id="2" name="Header Placeholder 1"/>
+          <p:cNvSpPr>
+            <a:spLocks noGrp="1"/>
+          </p:cNvSpPr>
+          <p:nvPr>
+            <p:ph type="hdr" sz="quarter"/>
+          </p:nvPr>
+        </p:nvSpPr>
+        <p:spPr>
+          <a:xfrm>
+            <a:off x="0" y="0"/>
+            <a:ext cx="2971800" cy="458788"/>
+          </a:xfrm>
+          <a:prstGeom prst="rect">
+            <a:avLst/>
+          </a:prstGeom>
+        </p:spPr>
+        <p:txBody>
+          <a:bodyPr vert="horz" lIns="91440" tIns="45720" rIns="91440" bIns="45720" rtlCol="0"/>
+          <a:lstStyle>
+            <a:lvl1pPr algn="l">
+              <a:defRPr sz="1200"/>
+            </a:lvl1pPr>
+          </a:lstStyle>
+          <a:p>
+            <a:endParaRPr lang="en-US"/>
+          </a:p>
+        </p:txBody>
+      </p:sp>
+      <p:sp>
+        <p:nvSpPr>
+          <p:cNvPr id="3" name="Date Placeholder 2"/>
+          <p:cNvSpPr>
+            <a:spLocks noGrp="1"/>
+          </p:cNvSpPr>
+          <p:nvPr>
+            <p:ph type="dt" idx="1"/>
+          </p:nvPr>
+        </p:nvSpPr>
+        <p:spPr>
+          <a:xfrm>
+            <a:off x="3884613" y="0"/>
+            <a:ext cx="2971800" cy="458788"/>
+          </a:xfrm>
+          <a:prstGeom prst="rect">
+            <a:avLst/>
+          </a:prstGeom>
+        </p:spPr>
+        <p:txBody>
+          <a:bodyPr vert="horz" lIns="91440" tIns="45720" rIns="91440" bIns="45720" rtlCol="0"/>
+          <a:lstStyle>
+            <a:lvl1pPr algn="r">
+              <a:defRPr sz="1200"/>
+            </a:lvl1pPr>
+          </a:lstStyle>
+          <a:p>
+            <a:fld id="{524241D9-5E50-413B-9646-06DCCB4C33C8}" type="datetimeFigureOut">
+              <a:rPr lang="en-US" smtClean="0"/>
+              <a:t>5/18/2023</a:t>
+            </a:fld>
+            <a:endParaRPr lang="en-US"/>
+          </a:p>
+        </p:txBody>
+      </p:sp>
+      <p:sp>
+        <p:nvSpPr>
+          <p:cNvPr id="4" name="Slide Image Placeholder 3"/>
+          <p:cNvSpPr>
+            <a:spLocks noGrp="1" noRot="1" noChangeAspect="1"/>
+          </p:cNvSpPr>
+          <p:nvPr>
+            <p:ph type="sldImg" idx="2"/>
+          </p:nvPr>
+        </p:nvSpPr>
+        <p:spPr>
+          <a:xfrm>
+            <a:off x="685800" y="1143000"/>
+            <a:ext cx="5486400" cy="3086100"/>
+          </a:xfrm>
+          <a:prstGeom prst="rect">
+            <a:avLst/>
+          </a:prstGeom>
+          <a:noFill/>
+          <a:ln w="12700">
+            <a:solidFill>
+              <a:prstClr val="black"/>
+            </a:solidFill>
+          </a:ln>
+        </p:spPr>
+        <p:txBody>
+          <a:bodyPr vert="horz" lIns="91440" tIns="45720" rIns="91440" bIns="45720" rtlCol="0" anchor="ctr"/>
+          <a:lstStyle/>
+          <a:p>
+            <a:endParaRPr lang="en-US"/>
+          </a:p>
+        </p:txBody>
+      </p:sp>
+      <p:sp>
+        <p:nvSpPr>
+          <p:cNvPr id="5" name="Notes Placeholder 4"/>
+          <p:cNvSpPr>
+            <a:spLocks noGrp="1"/>
+          </p:cNvSpPr>
+          <p:nvPr>
+            <p:ph type="body" sz="quarter" idx="3"/>
+          </p:nvPr>
+        </p:nvSpPr>
+        <p:spPr>
+          <a:xfrm>
+            <a:off x="685800" y="4400550"/>
+            <a:ext cx="5486400" cy="3600450"/>
+          </a:xfrm>
+          <a:prstGeom prst="rect">
+            <a:avLst/>
+          </a:prstGeom>
+        </p:spPr>
+        <p:txBody>
+          <a:bodyPr vert="horz" lIns="91440" tIns="45720" rIns="91440" bIns="45720" rtlCol="0"/>
+          <a:lstStyle/>
+          <a:p>
+            <a:pPr lvl="0"/>
+            <a:r>
+              <a:rPr lang="en-US"/>
+              <a:t>Click to edit Master text styles</a:t>
+            </a:r>
+          </a:p>
+          <a:p>
+            <a:pPr lvl="1"/>
+            <a:r>
+              <a:rPr lang="en-US"/>
+              <a:t>Second level</a:t>
+            </a:r>
+          </a:p>
+          <a:p>
+            <a:pPr lvl="2"/>
+            <a:r>
+              <a:rPr lang="en-US"/>
+              <a:t>Third level</a:t>
+            </a:r>
+          </a:p>
+          <a:p>
+            <a:pPr lvl="3"/>
+            <a:r>
+              <a:rPr lang="en-US"/>
+              <a:t>Fourth level</a:t>
+            </a:r>
+          </a:p>
+          <a:p>
+            <a:pPr lvl="4"/>
+            <a:r>
+              <a:rPr lang="en-US"/>
+              <a:t>Fifth level</a:t>
+            </a:r>
+          </a:p>
+        </p:txBody>
+      </p:sp>
+      <p:sp>
+        <p:nvSpPr>
+          <p:cNvPr id="6" name="Footer Placeholder 5"/>
+          <p:cNvSpPr>
+            <a:spLocks noGrp="1"/>
+          </p:cNvSpPr>
+          <p:nvPr>
+            <p:ph type="ftr" sz="quarter" idx="4"/>
+          </p:nvPr>
+        </p:nvSpPr>
+        <p:spPr>
+          <a:xfrm>
+            <a:off x="0" y="8685213"/>
+            <a:ext cx="2971800" cy="458787"/>
+          </a:xfrm>
+          <a:prstGeom prst="rect">
+            <a:avLst/>
+          </a:prstGeom>
+        </p:spPr>
+        <p:txBody>
+          <a:bodyPr vert="horz" lIns="91440" tIns="45720" rIns="91440" bIns="45720" rtlCol="0" anchor="b"/>
+          <a:lstStyle>
+            <a:lvl1pPr algn="l">
+              <a:defRPr sz="1200"/>
+            </a:lvl1pPr>
+          </a:lstStyle>
+          <a:p>
+            <a:endParaRPr lang="en-US"/>
+          </a:p>
+        </p:txBody>
+      </p:sp>
+      <p:sp>
+        <p:nvSpPr>
+          <p:cNvPr id="7" name="Slide Number Placeholder 6"/>
+          <p:cNvSpPr>
+            <a:spLocks noGrp="1"/>
+          </p:cNvSpPr>
+          <p:nvPr>
+            <p:ph type="sldNum" sz="quarter" idx="5"/>
+          </p:nvPr>
+        </p:nvSpPr>
+        <p:spPr>
+          <a:xfrm>
+            <a:off x="3884613" y="8685213"/>
+            <a:ext cx="2971800" cy="458787"/>
+          </a:xfrm>
+          <a:prstGeom prst="rect">
+            <a:avLst/>
+          </a:prstGeom>
+        </p:spPr>
+        <p:txBody>
+          <a:bodyPr vert="horz" lIns="91440" tIns="45720" rIns="91440" bIns="45720" rtlCol="0" anchor="b"/>
+          <a:lstStyle>
+            <a:lvl1pPr algn="r">
+              <a:defRPr sz="1200"/>
+            </a:lvl1pPr>
+          </a:lstStyle>
+          <a:p>
+            <a:fld id="{B0A3B5CE-7141-4C98-A862-80EEDD9041BA}" type="slidenum">
+              <a:rPr lang="en-US" smtClean="0"/>
+              <a:t>‹#›</a:t>
+            </a:fld>
+            <a:endParaRPr lang="en-US"/>
+          </a:p>
+        </p:txBody>
+      </p:sp>
+    </p:spTree>
+    <p:extLst>
+      <p:ext uri="{BB962C8B-B14F-4D97-AF65-F5344CB8AC3E}">
+        <p14:creationId xmlns:p14="http://schemas.microsoft.com/office/powerpoint/2010/main" val="1312832517"/>
+      </p:ext>
+    </p:extLst>
+  </p:cSld>
+  <p:clrMap bg1="lt1" tx1="dk1" bg2="lt2" tx2="dk2" accent1="accent1" accent2="accent2" accent3="accent3" accent4="accent4" accent5="accent5" accent6="accent6" hlink="hlink" folHlink="folHlink"/>
+  <p:notesStyle>
+    <a:lvl1pPr marL="0" algn="l" defTabSz="914400" rtl="0" eaLnBrk="1" latinLnBrk="0" hangingPunct="1">
+      <a:defRPr sz="1200" kern="1200">
+        <a:solidFill>
+          <a:schemeClr val="tx1"/>
+        </a:solidFill>
+        <a:latin typeface="+mn-lt"/>
+        <a:ea typeface="+mn-ea"/>
+        <a:cs typeface="+mn-cs"/>
+      </a:defRPr>
+    </a:lvl1pPr>
+    <a:lvl2pPr marL="457200" algn="l" defTabSz="914400" rtl="0" eaLnBrk="1" latinLnBrk="0" hangingPunct="1">
+      <a:defRPr sz="1200" kern="1200">
+        <a:solidFill>
+          <a:schemeClr val="tx1"/>
+        </a:solidFill>
+        <a:latin typeface="+mn-lt"/>
+        <a:ea typeface="+mn-ea"/>
+        <a:cs typeface="+mn-cs"/>
+      </a:defRPr>
+    </a:lvl2pPr>
+    <a:lvl3pPr marL="914400" algn="l" defTabSz="914400" rtl="0" eaLnBrk="1" latinLnBrk="0" hangingPunct="1">
+      <a:defRPr sz="1200" kern="1200">
+        <a:solidFill>
+          <a:schemeClr val="tx1"/>
+        </a:solidFill>
+        <a:latin typeface="+mn-lt"/>
+        <a:ea typeface="+mn-ea"/>
+        <a:cs typeface="+mn-cs"/>
+      </a:defRPr>
+    </a:lvl3pPr>
+    <a:lvl4pPr marL="1371600" algn="l" defTabSz="914400" rtl="0" eaLnBrk="1" latinLnBrk="0" hangingPunct="1">
+      <a:defRPr sz="1200" kern="1200">
+        <a:solidFill>
+          <a:schemeClr val="tx1"/>
+        </a:solidFill>
+        <a:latin typeface="+mn-lt"/>
+        <a:ea typeface="+mn-ea"/>
+        <a:cs typeface="+mn-cs"/>
+      </a:defRPr>
+    </a:lvl4pPr>
+    <a:lvl5pPr marL="1828800" algn="l" defTabSz="914400" rtl="0" eaLnBrk="1" latinLnBrk="0" hangingPunct="1">
+      <a:defRPr sz="1200" kern="1200">
+        <a:solidFill>
+          <a:schemeClr val="tx1"/>
+        </a:solidFill>
+        <a:latin typeface="+mn-lt"/>
+        <a:ea typeface="+mn-ea"/>
+        <a:cs typeface="+mn-cs"/>
+      </a:defRPr>
+    </a:lvl5pPr>
+    <a:lvl6pPr marL="2286000" algn="l" defTabSz="914400" rtl="0" eaLnBrk="1" latinLnBrk="0" hangingPunct="1">
+      <a:defRPr sz="1200" kern="1200">
+        <a:solidFill>
+          <a:schemeClr val="tx1"/>
+        </a:solidFill>
+        <a:latin typeface="+mn-lt"/>
+        <a:ea typeface="+mn-ea"/>
+        <a:cs typeface="+mn-cs"/>
+      </a:defRPr>
+    </a:lvl6pPr>
+    <a:lvl7pPr marL="2743200" algn="l" defTabSz="914400" rtl="0" eaLnBrk="1" latinLnBrk="0" hangingPunct="1">
+      <a:defRPr sz="1200" kern="1200">
+        <a:solidFill>
+          <a:schemeClr val="tx1"/>
+        </a:solidFill>
+        <a:latin typeface="+mn-lt"/>
+        <a:ea typeface="+mn-ea"/>
+        <a:cs typeface="+mn-cs"/>
+      </a:defRPr>
+    </a:lvl7pPr>
+    <a:lvl8pPr marL="3200400" algn="l" defTabSz="914400" rtl="0" eaLnBrk="1" latinLnBrk="0" hangingPunct="1">
+      <a:defRPr sz="1200" kern="1200">
+        <a:solidFill>
+          <a:schemeClr val="tx1"/>
+        </a:solidFill>
+        <a:latin typeface="+mn-lt"/>
+        <a:ea typeface="+mn-ea"/>
+        <a:cs typeface="+mn-cs"/>
+      </a:defRPr>
+    </a:lvl8pPr>
+    <a:lvl9pPr marL="3657600" algn="l" defTabSz="914400" rtl="0" eaLnBrk="1" latinLnBrk="0" hangingPunct="1">
+      <a:defRPr sz="1200" kern="1200">
+        <a:solidFill>
+          <a:schemeClr val="tx1"/>
+        </a:solidFill>
+        <a:latin typeface="+mn-lt"/>
+        <a:ea typeface="+mn-ea"/>
+        <a:cs typeface="+mn-cs"/>
+      </a:defRPr>
+    </a:lvl9pPr>
+  </p:notesStyle>
+</p:notesMaster>
+</file>
+
+<file path=ppt/notesSlides/notesSlide1.xml><?xml version="1.0" encoding="utf-8"?>
+<p:notes xmlns:a="http://schemas.openxmlformats.org/drawingml/2006/main" xmlns:r="http://schemas.openxmlformats.org/officeDocument/2006/relationships" xmlns:p="http://schemas.openxmlformats.org/presentationml/2006/main">
+  <p:cSld>
+    <p:spTree>
+      <p:nvGrpSpPr>
+        <p:cNvPr id="1" name=""/>
+        <p:cNvGrpSpPr/>
+        <p:nvPr/>
+      </p:nvGrpSpPr>
+      <p:grpSpPr>
+        <a:xfrm>
+          <a:off x="0" y="0"/>
+          <a:ext cx="0" cy="0"/>
+          <a:chOff x="0" y="0"/>
+          <a:chExt cx="0" cy="0"/>
+        </a:xfrm>
+      </p:grpSpPr>
+      <p:sp>
+        <p:nvSpPr>
+          <p:cNvPr id="2" name="Slide Image Placeholder 1"/>
+          <p:cNvSpPr>
+            <a:spLocks noGrp="1" noRot="1" noChangeAspect="1"/>
+          </p:cNvSpPr>
+          <p:nvPr>
+            <p:ph type="sldImg"/>
+          </p:nvPr>
+        </p:nvSpPr>
+        <p:spPr/>
+      </p:sp>
+      <p:sp>
+        <p:nvSpPr>
+          <p:cNvPr id="3" name="Notes Placeholder 2"/>
+          <p:cNvSpPr>
+            <a:spLocks noGrp="1"/>
+          </p:cNvSpPr>
+          <p:nvPr>
+            <p:ph type="body" idx="1"/>
+          </p:nvPr>
+        </p:nvSpPr>
+        <p:spPr/>
+        <p:txBody>
+          <a:bodyPr/>
+          <a:lstStyle/>
+          <a:p>
+            <a:r>
+              <a:rPr lang="en-US" dirty="0"/>
+              <a:t>Illustrated relation btwn concession distribution &lt;-&gt; corresponding adjacency matrix</a:t>
+            </a:r>
+          </a:p>
+        </p:txBody>
+      </p:sp>
+      <p:sp>
+        <p:nvSpPr>
+          <p:cNvPr id="4" name="Slide Number Placeholder 3"/>
+          <p:cNvSpPr>
+            <a:spLocks noGrp="1"/>
+          </p:cNvSpPr>
+          <p:nvPr>
+            <p:ph type="sldNum" sz="quarter" idx="5"/>
+          </p:nvPr>
+        </p:nvSpPr>
+        <p:spPr/>
+        <p:txBody>
+          <a:bodyPr/>
+          <a:lstStyle/>
+          <a:p>
+            <a:fld id="{B0A3B5CE-7141-4C98-A862-80EEDD9041BA}" type="slidenum">
+              <a:rPr lang="en-US" smtClean="0"/>
+              <a:t>5</a:t>
+            </a:fld>
+            <a:endParaRPr lang="en-US"/>
+          </a:p>
+        </p:txBody>
+      </p:sp>
+    </p:spTree>
+    <p:extLst>
+      <p:ext uri="{BB962C8B-B14F-4D97-AF65-F5344CB8AC3E}">
+        <p14:creationId xmlns:p14="http://schemas.microsoft.com/office/powerpoint/2010/main" val="637289432"/>
+      </p:ext>
+    </p:extLst>
+  </p:cSld>
+  <p:clrMapOvr>
+    <a:masterClrMapping/>
+  </p:clrMapOvr>
+</p:notes>
+</file>
+
+<file path=ppt/notesSlides/notesSlide2.xml><?xml version="1.0" encoding="utf-8"?>
+<p:notes xmlns:a="http://schemas.openxmlformats.org/drawingml/2006/main" xmlns:r="http://schemas.openxmlformats.org/officeDocument/2006/relationships" xmlns:p="http://schemas.openxmlformats.org/presentationml/2006/main">
+  <p:cSld>
+    <p:spTree>
+      <p:nvGrpSpPr>
+        <p:cNvPr id="1" name=""/>
+        <p:cNvGrpSpPr/>
+        <p:nvPr/>
+      </p:nvGrpSpPr>
+      <p:grpSpPr>
+        <a:xfrm>
+          <a:off x="0" y="0"/>
+          <a:ext cx="0" cy="0"/>
+          <a:chOff x="0" y="0"/>
+          <a:chExt cx="0" cy="0"/>
+        </a:xfrm>
+      </p:grpSpPr>
+      <p:sp>
+        <p:nvSpPr>
+          <p:cNvPr id="2" name="Slide Image Placeholder 1"/>
+          <p:cNvSpPr>
+            <a:spLocks noGrp="1" noRot="1" noChangeAspect="1"/>
+          </p:cNvSpPr>
+          <p:nvPr>
+            <p:ph type="sldImg"/>
+          </p:nvPr>
+        </p:nvSpPr>
+        <p:spPr/>
+      </p:sp>
+      <p:sp>
+        <p:nvSpPr>
+          <p:cNvPr id="3" name="Notes Placeholder 2"/>
+          <p:cNvSpPr>
+            <a:spLocks noGrp="1"/>
+          </p:cNvSpPr>
+          <p:nvPr>
+            <p:ph type="body" idx="1"/>
+          </p:nvPr>
+        </p:nvSpPr>
+        <p:spPr/>
+        <p:txBody>
+          <a:bodyPr/>
+          <a:lstStyle/>
+          <a:p>
+            <a:endParaRPr lang="en-US" dirty="0"/>
+          </a:p>
+        </p:txBody>
+      </p:sp>
+      <p:sp>
+        <p:nvSpPr>
+          <p:cNvPr id="4" name="Slide Number Placeholder 3"/>
+          <p:cNvSpPr>
+            <a:spLocks noGrp="1"/>
+          </p:cNvSpPr>
+          <p:nvPr>
+            <p:ph type="sldNum" sz="quarter" idx="5"/>
+          </p:nvPr>
+        </p:nvSpPr>
+        <p:spPr/>
+        <p:txBody>
+          <a:bodyPr/>
+          <a:lstStyle/>
+          <a:p>
+            <a:fld id="{B0A3B5CE-7141-4C98-A862-80EEDD9041BA}" type="slidenum">
+              <a:rPr lang="en-US" smtClean="0"/>
+              <a:t>6</a:t>
+            </a:fld>
+            <a:endParaRPr lang="en-US"/>
+          </a:p>
+        </p:txBody>
+      </p:sp>
+    </p:spTree>
+    <p:extLst>
+      <p:ext uri="{BB962C8B-B14F-4D97-AF65-F5344CB8AC3E}">
+        <p14:creationId xmlns:p14="http://schemas.microsoft.com/office/powerpoint/2010/main" val="2969268779"/>
+      </p:ext>
+    </p:extLst>
+  </p:cSld>
+  <p:clrMapOvr>
+    <a:masterClrMapping/>
+  </p:clrMapOvr>
+</p:notes>
+</file>
+
+<file path=ppt/notesSlides/notesSlide3.xml><?xml version="1.0" encoding="utf-8"?>
+<p:notes xmlns:a="http://schemas.openxmlformats.org/drawingml/2006/main" xmlns:r="http://schemas.openxmlformats.org/officeDocument/2006/relationships" xmlns:p="http://schemas.openxmlformats.org/presentationml/2006/main">
+  <p:cSld>
+    <p:spTree>
+      <p:nvGrpSpPr>
+        <p:cNvPr id="1" name=""/>
+        <p:cNvGrpSpPr/>
+        <p:nvPr/>
+      </p:nvGrpSpPr>
+      <p:grpSpPr>
+        <a:xfrm>
+          <a:off x="0" y="0"/>
+          <a:ext cx="0" cy="0"/>
+          <a:chOff x="0" y="0"/>
+          <a:chExt cx="0" cy="0"/>
+        </a:xfrm>
+      </p:grpSpPr>
+      <p:sp>
+        <p:nvSpPr>
+          <p:cNvPr id="2" name="Slide Image Placeholder 1"/>
+          <p:cNvSpPr>
+            <a:spLocks noGrp="1" noRot="1" noChangeAspect="1"/>
+          </p:cNvSpPr>
+          <p:nvPr>
+            <p:ph type="sldImg"/>
+          </p:nvPr>
+        </p:nvSpPr>
+        <p:spPr/>
+      </p:sp>
+      <p:sp>
+        <p:nvSpPr>
+          <p:cNvPr id="3" name="Notes Placeholder 2"/>
+          <p:cNvSpPr>
+            <a:spLocks noGrp="1"/>
+          </p:cNvSpPr>
+          <p:nvPr>
+            <p:ph type="body" idx="1"/>
+          </p:nvPr>
+        </p:nvSpPr>
+        <p:spPr/>
+        <p:txBody>
+          <a:bodyPr/>
+          <a:lstStyle/>
+          <a:p>
+            <a:r>
+              <a:rPr lang="en-US" dirty="0"/>
+              <a:t>Adjacency matrices over time</a:t>
+            </a:r>
+          </a:p>
+        </p:txBody>
+      </p:sp>
+      <p:sp>
+        <p:nvSpPr>
+          <p:cNvPr id="4" name="Slide Number Placeholder 3"/>
+          <p:cNvSpPr>
+            <a:spLocks noGrp="1"/>
+          </p:cNvSpPr>
+          <p:nvPr>
+            <p:ph type="sldNum" sz="quarter" idx="5"/>
+          </p:nvPr>
+        </p:nvSpPr>
+        <p:spPr/>
+        <p:txBody>
+          <a:bodyPr/>
+          <a:lstStyle/>
+          <a:p>
+            <a:fld id="{B0A3B5CE-7141-4C98-A862-80EEDD9041BA}" type="slidenum">
+              <a:rPr lang="en-US" smtClean="0"/>
+              <a:t>16</a:t>
+            </a:fld>
+            <a:endParaRPr lang="en-US"/>
+          </a:p>
+        </p:txBody>
+      </p:sp>
+    </p:spTree>
+    <p:extLst>
+      <p:ext uri="{BB962C8B-B14F-4D97-AF65-F5344CB8AC3E}">
+        <p14:creationId xmlns:p14="http://schemas.microsoft.com/office/powerpoint/2010/main" val="3555610159"/>
+      </p:ext>
+    </p:extLst>
+  </p:cSld>
+  <p:clrMapOvr>
+    <a:masterClrMapping/>
+  </p:clrMapOvr>
+</p:notes>
+</file>
+
 <file path=ppt/slideLayouts/slideLayout1.xml><?xml version="1.0" encoding="utf-8"?>
 <p:sldLayout xmlns:a="http://schemas.openxmlformats.org/drawingml/2006/main" xmlns:r="http://schemas.openxmlformats.org/officeDocument/2006/relationships" xmlns:p="http://schemas.openxmlformats.org/presentationml/2006/main" type="title" preserve="1">
   <p:cSld name="Title Slide">
@@ -366,7 +977,7 @@
           <a:p>
             <a:fld id="{B113C145-2AB4-4EE4-9248-3057A0948AE2}" type="datetimeFigureOut">
               <a:rPr lang="en-US" smtClean="0"/>
-              <a:t>7/25/2022</a:t>
+              <a:t>5/18/2023</a:t>
             </a:fld>
             <a:endParaRPr lang="en-US"/>
           </a:p>
@@ -564,7 +1175,7 @@
           <a:p>
             <a:fld id="{B113C145-2AB4-4EE4-9248-3057A0948AE2}" type="datetimeFigureOut">
               <a:rPr lang="en-US" smtClean="0"/>
-              <a:t>7/25/2022</a:t>
+              <a:t>5/18/2023</a:t>
             </a:fld>
             <a:endParaRPr lang="en-US"/>
           </a:p>
@@ -772,7 +1383,7 @@
           <a:p>
             <a:fld id="{B113C145-2AB4-4EE4-9248-3057A0948AE2}" type="datetimeFigureOut">
               <a:rPr lang="en-US" smtClean="0"/>
-              <a:t>7/25/2022</a:t>
+              <a:t>5/18/2023</a:t>
             </a:fld>
             <a:endParaRPr lang="en-US"/>
           </a:p>
@@ -970,7 +1581,7 @@
           <a:p>
             <a:fld id="{B113C145-2AB4-4EE4-9248-3057A0948AE2}" type="datetimeFigureOut">
               <a:rPr lang="en-US" smtClean="0"/>
-              <a:t>7/25/2022</a:t>
+              <a:t>5/18/2023</a:t>
             </a:fld>
             <a:endParaRPr lang="en-US"/>
           </a:p>
@@ -1245,7 +1856,7 @@
           <a:p>
             <a:fld id="{B113C145-2AB4-4EE4-9248-3057A0948AE2}" type="datetimeFigureOut">
               <a:rPr lang="en-US" smtClean="0"/>
-              <a:t>7/25/2022</a:t>
+              <a:t>5/18/2023</a:t>
             </a:fld>
             <a:endParaRPr lang="en-US"/>
           </a:p>
@@ -1510,7 +2121,7 @@
           <a:p>
             <a:fld id="{B113C145-2AB4-4EE4-9248-3057A0948AE2}" type="datetimeFigureOut">
               <a:rPr lang="en-US" smtClean="0"/>
-              <a:t>7/25/2022</a:t>
+              <a:t>5/18/2023</a:t>
             </a:fld>
             <a:endParaRPr lang="en-US"/>
           </a:p>
@@ -1922,7 +2533,7 @@
           <a:p>
             <a:fld id="{B113C145-2AB4-4EE4-9248-3057A0948AE2}" type="datetimeFigureOut">
               <a:rPr lang="en-US" smtClean="0"/>
-              <a:t>7/25/2022</a:t>
+              <a:t>5/18/2023</a:t>
             </a:fld>
             <a:endParaRPr lang="en-US"/>
           </a:p>
@@ -2063,7 +2674,7 @@
           <a:p>
             <a:fld id="{B113C145-2AB4-4EE4-9248-3057A0948AE2}" type="datetimeFigureOut">
               <a:rPr lang="en-US" smtClean="0"/>
-              <a:t>7/25/2022</a:t>
+              <a:t>5/18/2023</a:t>
             </a:fld>
             <a:endParaRPr lang="en-US"/>
           </a:p>
@@ -2176,7 +2787,7 @@
           <a:p>
             <a:fld id="{B113C145-2AB4-4EE4-9248-3057A0948AE2}" type="datetimeFigureOut">
               <a:rPr lang="en-US" smtClean="0"/>
-              <a:t>7/25/2022</a:t>
+              <a:t>5/18/2023</a:t>
             </a:fld>
             <a:endParaRPr lang="en-US"/>
           </a:p>
@@ -2487,7 +3098,7 @@
           <a:p>
             <a:fld id="{B113C145-2AB4-4EE4-9248-3057A0948AE2}" type="datetimeFigureOut">
               <a:rPr lang="en-US" smtClean="0"/>
-              <a:t>7/25/2022</a:t>
+              <a:t>5/18/2023</a:t>
             </a:fld>
             <a:endParaRPr lang="en-US"/>
           </a:p>
@@ -2775,7 +3386,7 @@
           <a:p>
             <a:fld id="{B113C145-2AB4-4EE4-9248-3057A0948AE2}" type="datetimeFigureOut">
               <a:rPr lang="en-US" smtClean="0"/>
-              <a:t>7/25/2022</a:t>
+              <a:t>5/18/2023</a:t>
             </a:fld>
             <a:endParaRPr lang="en-US"/>
           </a:p>
@@ -3016,7 +3627,7 @@
           <a:p>
             <a:fld id="{B113C145-2AB4-4EE4-9248-3057A0948AE2}" type="datetimeFigureOut">
               <a:rPr lang="en-US" smtClean="0"/>
-              <a:t>7/25/2022</a:t>
+              <a:t>5/18/2023</a:t>
             </a:fld>
             <a:endParaRPr lang="en-US"/>
           </a:p>
@@ -6058,7 +6669,7 @@
         </p:nvGrpSpPr>
         <p:grpSpPr>
           <a:xfrm>
-            <a:off x="10441819" y="5353689"/>
+            <a:off x="10441819" y="5369591"/>
             <a:ext cx="1394460" cy="1409700"/>
             <a:chOff x="4551045" y="2554605"/>
             <a:chExt cx="1394460" cy="1409700"/>
@@ -7463,6 +8074,66 @@
 </file>
 
 <file path=ppt/slides/slide10.xml><?xml version="1.0" encoding="utf-8"?>
+<p:sld xmlns:a="http://schemas.openxmlformats.org/drawingml/2006/main" xmlns:r="http://schemas.openxmlformats.org/officeDocument/2006/relationships" xmlns:p="http://schemas.openxmlformats.org/presentationml/2006/main">
+  <p:cSld>
+    <p:spTree>
+      <p:nvGrpSpPr>
+        <p:cNvPr id="1" name=""/>
+        <p:cNvGrpSpPr/>
+        <p:nvPr/>
+      </p:nvGrpSpPr>
+      <p:grpSpPr>
+        <a:xfrm>
+          <a:off x="0" y="0"/>
+          <a:ext cx="0" cy="0"/>
+          <a:chOff x="0" y="0"/>
+          <a:chExt cx="0" cy="0"/>
+        </a:xfrm>
+      </p:grpSpPr>
+      <p:pic>
+        <p:nvPicPr>
+          <p:cNvPr id="3" name="Picture 2">
+            <a:extLst>
+              <a:ext uri="{FF2B5EF4-FFF2-40B4-BE49-F238E27FC236}">
+                <a16:creationId xmlns:a16="http://schemas.microsoft.com/office/drawing/2014/main" id="{9F4AE0C5-243D-3351-DAAB-AFA2953CF458}"/>
+              </a:ext>
+            </a:extLst>
+          </p:cNvPr>
+          <p:cNvPicPr>
+            <a:picLocks noChangeAspect="1"/>
+          </p:cNvPicPr>
+          <p:nvPr/>
+        </p:nvPicPr>
+        <p:blipFill>
+          <a:blip r:embed="rId2"/>
+          <a:stretch>
+            <a:fillRect/>
+          </a:stretch>
+        </p:blipFill>
+        <p:spPr>
+          <a:xfrm>
+            <a:off x="10902" y="178788"/>
+            <a:ext cx="12170195" cy="6500423"/>
+          </a:xfrm>
+          <a:prstGeom prst="rect">
+            <a:avLst/>
+          </a:prstGeom>
+        </p:spPr>
+      </p:pic>
+    </p:spTree>
+    <p:extLst>
+      <p:ext uri="{BB962C8B-B14F-4D97-AF65-F5344CB8AC3E}">
+        <p14:creationId xmlns:p14="http://schemas.microsoft.com/office/powerpoint/2010/main" val="2250559178"/>
+      </p:ext>
+    </p:extLst>
+  </p:cSld>
+  <p:clrMapOvr>
+    <a:masterClrMapping/>
+  </p:clrMapOvr>
+</p:sld>
+</file>
+
+<file path=ppt/slides/slide11.xml><?xml version="1.0" encoding="utf-8"?>
 <p:sld xmlns:a="http://schemas.openxmlformats.org/drawingml/2006/main" xmlns:r="http://schemas.openxmlformats.org/officeDocument/2006/relationships" xmlns:p="http://schemas.openxmlformats.org/presentationml/2006/main">
   <p:cSld>
     <p:spTree>
@@ -7552,7 +8223,7 @@
 </p:sld>
 </file>
 
-<file path=ppt/slides/slide11.xml><?xml version="1.0" encoding="utf-8"?>
+<file path=ppt/slides/slide12.xml><?xml version="1.0" encoding="utf-8"?>
 <p:sld xmlns:a="http://schemas.openxmlformats.org/drawingml/2006/main" xmlns:r="http://schemas.openxmlformats.org/officeDocument/2006/relationships" xmlns:p="http://schemas.openxmlformats.org/presentationml/2006/main">
   <p:cSld>
     <p:spTree>
@@ -8066,7 +8737,7 @@
         <p:spPr>
           <a:xfrm>
             <a:off x="4942575" y="414216"/>
-            <a:ext cx="2306850" cy="369332"/>
+            <a:ext cx="6092630" cy="369332"/>
           </a:xfrm>
           <a:prstGeom prst="rect">
             <a:avLst/>
@@ -8081,7 +8752,7 @@
           <a:p>
             <a:r>
               <a:rPr lang="en-US" b="1" dirty="0"/>
-              <a:t>25-50% of cell covered</a:t>
+              <a:t>Analysis of logging concessions that are 25-50% of cell covered</a:t>
             </a:r>
           </a:p>
         </p:txBody>
@@ -8129,7 +8800,7 @@
 </p:sld>
 </file>
 
-<file path=ppt/slides/slide12.xml><?xml version="1.0" encoding="utf-8"?>
+<file path=ppt/slides/slide13.xml><?xml version="1.0" encoding="utf-8"?>
 <p:sld xmlns:a="http://schemas.openxmlformats.org/drawingml/2006/main" xmlns:r="http://schemas.openxmlformats.org/officeDocument/2006/relationships" xmlns:p="http://schemas.openxmlformats.org/presentationml/2006/main">
   <p:cSld>
     <p:spTree>
@@ -8219,7 +8890,7 @@
 </p:sld>
 </file>
 
-<file path=ppt/slides/slide13.xml><?xml version="1.0" encoding="utf-8"?>
+<file path=ppt/slides/slide14.xml><?xml version="1.0" encoding="utf-8"?>
 <p:sld xmlns:a="http://schemas.openxmlformats.org/drawingml/2006/main" xmlns:r="http://schemas.openxmlformats.org/officeDocument/2006/relationships" xmlns:p="http://schemas.openxmlformats.org/presentationml/2006/main">
   <p:cSld>
     <p:spTree>
@@ -8309,7 +8980,7 @@
 </p:sld>
 </file>
 
-<file path=ppt/slides/slide14.xml><?xml version="1.0" encoding="utf-8"?>
+<file path=ppt/slides/slide15.xml><?xml version="1.0" encoding="utf-8"?>
 <p:sld xmlns:a="http://schemas.openxmlformats.org/drawingml/2006/main" xmlns:r="http://schemas.openxmlformats.org/officeDocument/2006/relationships" xmlns:p="http://schemas.openxmlformats.org/presentationml/2006/main">
   <p:cSld>
     <p:spTree>
@@ -8369,7 +9040,7 @@
 </p:sld>
 </file>
 
-<file path=ppt/slides/slide15.xml><?xml version="1.0" encoding="utf-8"?>
+<file path=ppt/slides/slide16.xml><?xml version="1.0" encoding="utf-8"?>
 <p:sld xmlns:a="http://schemas.openxmlformats.org/drawingml/2006/main" xmlns:r="http://schemas.openxmlformats.org/officeDocument/2006/relationships" xmlns:p="http://schemas.openxmlformats.org/presentationml/2006/main">
   <p:cSld>
     <p:spTree>
@@ -8401,7 +9072,7 @@
           <p:nvPr/>
         </p:nvPicPr>
         <p:blipFill>
-          <a:blip r:embed="rId2">
+          <a:blip r:embed="rId3">
             <a:extLst>
               <a:ext uri="{28A0092B-C50C-407E-A947-70E740481C1C}">
                 <a14:useLocalDpi xmlns:a14="http://schemas.microsoft.com/office/drawing/2010/main" val="0"/>
@@ -8437,7 +9108,7 @@
           <p:nvPr/>
         </p:nvPicPr>
         <p:blipFill>
-          <a:blip r:embed="rId3">
+          <a:blip r:embed="rId4">
             <a:extLst>
               <a:ext uri="{28A0092B-C50C-407E-A947-70E740481C1C}">
                 <a14:useLocalDpi xmlns:a14="http://schemas.microsoft.com/office/drawing/2010/main" val="0"/>
@@ -8473,7 +9144,7 @@
           <p:nvPr/>
         </p:nvPicPr>
         <p:blipFill>
-          <a:blip r:embed="rId4">
+          <a:blip r:embed="rId5">
             <a:extLst>
               <a:ext uri="{28A0092B-C50C-407E-A947-70E740481C1C}">
                 <a14:useLocalDpi xmlns:a14="http://schemas.microsoft.com/office/drawing/2010/main" val="0"/>
@@ -8509,7 +9180,7 @@
           <p:nvPr/>
         </p:nvPicPr>
         <p:blipFill>
-          <a:blip r:embed="rId5">
+          <a:blip r:embed="rId6">
             <a:extLst>
               <a:ext uri="{28A0092B-C50C-407E-A947-70E740481C1C}">
                 <a14:useLocalDpi xmlns:a14="http://schemas.microsoft.com/office/drawing/2010/main" val="0"/>
@@ -8545,7 +9216,7 @@
           <p:nvPr/>
         </p:nvPicPr>
         <p:blipFill>
-          <a:blip r:embed="rId6">
+          <a:blip r:embed="rId7">
             <a:extLst>
               <a:ext uri="{28A0092B-C50C-407E-A947-70E740481C1C}">
                 <a14:useLocalDpi xmlns:a14="http://schemas.microsoft.com/office/drawing/2010/main" val="0"/>
@@ -8581,7 +9252,7 @@
           <p:nvPr/>
         </p:nvPicPr>
         <p:blipFill>
-          <a:blip r:embed="rId7">
+          <a:blip r:embed="rId8">
             <a:extLst>
               <a:ext uri="{28A0092B-C50C-407E-A947-70E740481C1C}">
                 <a14:useLocalDpi xmlns:a14="http://schemas.microsoft.com/office/drawing/2010/main" val="0"/>
@@ -8617,7 +9288,7 @@
           <p:nvPr/>
         </p:nvPicPr>
         <p:blipFill>
-          <a:blip r:embed="rId8">
+          <a:blip r:embed="rId9">
             <a:extLst>
               <a:ext uri="{28A0092B-C50C-407E-A947-70E740481C1C}">
                 <a14:useLocalDpi xmlns:a14="http://schemas.microsoft.com/office/drawing/2010/main" val="0"/>
@@ -8653,7 +9324,7 @@
           <p:nvPr/>
         </p:nvPicPr>
         <p:blipFill>
-          <a:blip r:embed="rId9">
+          <a:blip r:embed="rId10">
             <a:extLst>
               <a:ext uri="{28A0092B-C50C-407E-A947-70E740481C1C}">
                 <a14:useLocalDpi xmlns:a14="http://schemas.microsoft.com/office/drawing/2010/main" val="0"/>
@@ -8689,7 +9360,7 @@
           <p:nvPr/>
         </p:nvPicPr>
         <p:blipFill>
-          <a:blip r:embed="rId10">
+          <a:blip r:embed="rId11">
             <a:extLst>
               <a:ext uri="{28A0092B-C50C-407E-A947-70E740481C1C}">
                 <a14:useLocalDpi xmlns:a14="http://schemas.microsoft.com/office/drawing/2010/main" val="0"/>
@@ -12296,6 +12967,133 @@
           <a:chExt cx="0" cy="0"/>
         </a:xfrm>
       </p:grpSpPr>
+      <p:sp>
+        <p:nvSpPr>
+          <p:cNvPr id="2" name="Title 1">
+            <a:extLst>
+              <a:ext uri="{FF2B5EF4-FFF2-40B4-BE49-F238E27FC236}">
+                <a16:creationId xmlns:a16="http://schemas.microsoft.com/office/drawing/2014/main" id="{4C262323-F1B3-ED09-AE73-CC7E89C9D854}"/>
+              </a:ext>
+            </a:extLst>
+          </p:cNvPr>
+          <p:cNvSpPr>
+            <a:spLocks noGrp="1"/>
+          </p:cNvSpPr>
+          <p:nvPr>
+            <p:ph type="title"/>
+          </p:nvPr>
+        </p:nvSpPr>
+        <p:spPr/>
+        <p:txBody>
+          <a:bodyPr>
+            <a:normAutofit fontScale="90000"/>
+          </a:bodyPr>
+          <a:lstStyle/>
+          <a:p>
+            <a:r>
+              <a:rPr lang="en-US" dirty="0"/>
+              <a:t>Example result for plotting_cell_reference_coord_determination.py</a:t>
+            </a:r>
+            <a:br>
+              <a:rPr lang="en-US" dirty="0"/>
+            </a:br>
+            <a:r>
+              <a:rPr lang="en-US" dirty="0"/>
+              <a:t>left: full map, right: zoom in on a single point</a:t>
+            </a:r>
+          </a:p>
+        </p:txBody>
+      </p:sp>
+      <p:pic>
+        <p:nvPicPr>
+          <p:cNvPr id="4" name="Picture 3">
+            <a:extLst>
+              <a:ext uri="{FF2B5EF4-FFF2-40B4-BE49-F238E27FC236}">
+                <a16:creationId xmlns:a16="http://schemas.microsoft.com/office/drawing/2014/main" id="{F26A5ABC-CE93-E7E5-1F5B-DED7EB76058B}"/>
+              </a:ext>
+            </a:extLst>
+          </p:cNvPr>
+          <p:cNvPicPr>
+            <a:picLocks noChangeAspect="1"/>
+          </p:cNvPicPr>
+          <p:nvPr/>
+        </p:nvPicPr>
+        <p:blipFill>
+          <a:blip r:embed="rId2"/>
+          <a:stretch>
+            <a:fillRect/>
+          </a:stretch>
+        </p:blipFill>
+        <p:spPr>
+          <a:xfrm>
+            <a:off x="6096000" y="2119657"/>
+            <a:ext cx="5516581" cy="4263887"/>
+          </a:xfrm>
+          <a:prstGeom prst="rect">
+            <a:avLst/>
+          </a:prstGeom>
+        </p:spPr>
+      </p:pic>
+      <p:pic>
+        <p:nvPicPr>
+          <p:cNvPr id="6" name="Picture 5">
+            <a:extLst>
+              <a:ext uri="{FF2B5EF4-FFF2-40B4-BE49-F238E27FC236}">
+                <a16:creationId xmlns:a16="http://schemas.microsoft.com/office/drawing/2014/main" id="{3A773116-81C8-1FBF-732E-CC6944148B71}"/>
+              </a:ext>
+            </a:extLst>
+          </p:cNvPr>
+          <p:cNvPicPr>
+            <a:picLocks noChangeAspect="1"/>
+          </p:cNvPicPr>
+          <p:nvPr/>
+        </p:nvPicPr>
+        <p:blipFill>
+          <a:blip r:embed="rId3"/>
+          <a:stretch>
+            <a:fillRect/>
+          </a:stretch>
+        </p:blipFill>
+        <p:spPr>
+          <a:xfrm>
+            <a:off x="99391" y="2942117"/>
+            <a:ext cx="5849186" cy="2355440"/>
+          </a:xfrm>
+          <a:prstGeom prst="rect">
+            <a:avLst/>
+          </a:prstGeom>
+        </p:spPr>
+      </p:pic>
+    </p:spTree>
+    <p:extLst>
+      <p:ext uri="{BB962C8B-B14F-4D97-AF65-F5344CB8AC3E}">
+        <p14:creationId xmlns:p14="http://schemas.microsoft.com/office/powerpoint/2010/main" val="3923815721"/>
+      </p:ext>
+    </p:extLst>
+  </p:cSld>
+  <p:clrMapOvr>
+    <a:masterClrMapping/>
+  </p:clrMapOvr>
+</p:sld>
+</file>
+
+<file path=ppt/slides/slide5.xml><?xml version="1.0" encoding="utf-8"?>
+<p:sld xmlns:a="http://schemas.openxmlformats.org/drawingml/2006/main" xmlns:r="http://schemas.openxmlformats.org/officeDocument/2006/relationships" xmlns:p="http://schemas.openxmlformats.org/presentationml/2006/main">
+  <p:cSld>
+    <p:spTree>
+      <p:nvGrpSpPr>
+        <p:cNvPr id="1" name=""/>
+        <p:cNvGrpSpPr/>
+        <p:nvPr/>
+      </p:nvGrpSpPr>
+      <p:grpSpPr>
+        <a:xfrm>
+          <a:off x="0" y="0"/>
+          <a:ext cx="0" cy="0"/>
+          <a:chOff x="0" y="0"/>
+          <a:chExt cx="0" cy="0"/>
+        </a:xfrm>
+      </p:grpSpPr>
       <p:pic>
         <p:nvPicPr>
           <p:cNvPr id="3" name="Picture 2">
@@ -12311,7 +13109,7 @@
           <p:nvPr/>
         </p:nvPicPr>
         <p:blipFill>
-          <a:blip r:embed="rId2">
+          <a:blip r:embed="rId3">
             <a:extLst>
               <a:ext uri="{28A0092B-C50C-407E-A947-70E740481C1C}">
                 <a14:useLocalDpi xmlns:a14="http://schemas.microsoft.com/office/drawing/2010/main" val="0"/>
@@ -12347,7 +13145,7 @@
           <p:nvPr/>
         </p:nvPicPr>
         <p:blipFill>
-          <a:blip r:embed="rId3">
+          <a:blip r:embed="rId4">
             <a:extLst>
               <a:ext uri="{28A0092B-C50C-407E-A947-70E740481C1C}">
                 <a14:useLocalDpi xmlns:a14="http://schemas.microsoft.com/office/drawing/2010/main" val="0"/>
@@ -12381,7 +13179,7 @@
 </p:sld>
 </file>
 
-<file path=ppt/slides/slide5.xml><?xml version="1.0" encoding="utf-8"?>
+<file path=ppt/slides/slide6.xml><?xml version="1.0" encoding="utf-8"?>
 <p:sld xmlns:a="http://schemas.openxmlformats.org/drawingml/2006/main" xmlns:r="http://schemas.openxmlformats.org/officeDocument/2006/relationships" xmlns:p="http://schemas.openxmlformats.org/presentationml/2006/main">
   <p:cSld>
     <p:spTree>
@@ -13430,8 +14228,8 @@
         </p:nvSpPr>
         <p:spPr>
           <a:xfrm>
-            <a:off x="5025899" y="336062"/>
-            <a:ext cx="2140201" cy="369332"/>
+            <a:off x="2950308" y="306244"/>
+            <a:ext cx="6822317" cy="369332"/>
           </a:xfrm>
           <a:prstGeom prst="rect">
             <a:avLst/>
@@ -13446,7 +14244,7 @@
           <a:p>
             <a:r>
               <a:rPr lang="en-US" b="1" dirty="0"/>
-              <a:t>&lt;25% of cell covered</a:t>
+              <a:t>Analysis of the logging concessions that are &lt;25% covered by grid cells</a:t>
             </a:r>
           </a:p>
         </p:txBody>
@@ -13464,7 +14262,7 @@
 </p:sld>
 </file>
 
-<file path=ppt/slides/slide6.xml><?xml version="1.0" encoding="utf-8"?>
+<file path=ppt/slides/slide7.xml><?xml version="1.0" encoding="utf-8"?>
 <p:sld xmlns:a="http://schemas.openxmlformats.org/drawingml/2006/main" xmlns:r="http://schemas.openxmlformats.org/officeDocument/2006/relationships" xmlns:p="http://schemas.openxmlformats.org/presentationml/2006/main">
   <p:cSld>
     <p:spTree>
@@ -13554,7 +14352,7 @@
 </p:sld>
 </file>
 
-<file path=ppt/slides/slide7.xml><?xml version="1.0" encoding="utf-8"?>
+<file path=ppt/slides/slide8.xml><?xml version="1.0" encoding="utf-8"?>
 <p:sld xmlns:a="http://schemas.openxmlformats.org/drawingml/2006/main" xmlns:r="http://schemas.openxmlformats.org/officeDocument/2006/relationships" xmlns:p="http://schemas.openxmlformats.org/presentationml/2006/main">
   <p:cSld>
     <p:spTree>
@@ -13644,7 +14442,7 @@
 </p:sld>
 </file>
 
-<file path=ppt/slides/slide8.xml><?xml version="1.0" encoding="utf-8"?>
+<file path=ppt/slides/slide9.xml><?xml version="1.0" encoding="utf-8"?>
 <p:sld xmlns:a="http://schemas.openxmlformats.org/drawingml/2006/main" xmlns:r="http://schemas.openxmlformats.org/officeDocument/2006/relationships" xmlns:p="http://schemas.openxmlformats.org/presentationml/2006/main">
   <p:cSld>
     <p:spTree>
@@ -13725,66 +14523,6 @@
     <p:extLst>
       <p:ext uri="{BB962C8B-B14F-4D97-AF65-F5344CB8AC3E}">
         <p14:creationId xmlns:p14="http://schemas.microsoft.com/office/powerpoint/2010/main" val="1199422687"/>
-      </p:ext>
-    </p:extLst>
-  </p:cSld>
-  <p:clrMapOvr>
-    <a:masterClrMapping/>
-  </p:clrMapOvr>
-</p:sld>
-</file>
-
-<file path=ppt/slides/slide9.xml><?xml version="1.0" encoding="utf-8"?>
-<p:sld xmlns:a="http://schemas.openxmlformats.org/drawingml/2006/main" xmlns:r="http://schemas.openxmlformats.org/officeDocument/2006/relationships" xmlns:p="http://schemas.openxmlformats.org/presentationml/2006/main">
-  <p:cSld>
-    <p:spTree>
-      <p:nvGrpSpPr>
-        <p:cNvPr id="1" name=""/>
-        <p:cNvGrpSpPr/>
-        <p:nvPr/>
-      </p:nvGrpSpPr>
-      <p:grpSpPr>
-        <a:xfrm>
-          <a:off x="0" y="0"/>
-          <a:ext cx="0" cy="0"/>
-          <a:chOff x="0" y="0"/>
-          <a:chExt cx="0" cy="0"/>
-        </a:xfrm>
-      </p:grpSpPr>
-      <p:pic>
-        <p:nvPicPr>
-          <p:cNvPr id="3" name="Picture 2">
-            <a:extLst>
-              <a:ext uri="{FF2B5EF4-FFF2-40B4-BE49-F238E27FC236}">
-                <a16:creationId xmlns:a16="http://schemas.microsoft.com/office/drawing/2014/main" id="{9F4AE0C5-243D-3351-DAAB-AFA2953CF458}"/>
-              </a:ext>
-            </a:extLst>
-          </p:cNvPr>
-          <p:cNvPicPr>
-            <a:picLocks noChangeAspect="1"/>
-          </p:cNvPicPr>
-          <p:nvPr/>
-        </p:nvPicPr>
-        <p:blipFill>
-          <a:blip r:embed="rId2"/>
-          <a:stretch>
-            <a:fillRect/>
-          </a:stretch>
-        </p:blipFill>
-        <p:spPr>
-          <a:xfrm>
-            <a:off x="10902" y="178788"/>
-            <a:ext cx="12170195" cy="6500423"/>
-          </a:xfrm>
-          <a:prstGeom prst="rect">
-            <a:avLst/>
-          </a:prstGeom>
-        </p:spPr>
-      </p:pic>
-    </p:spTree>
-    <p:extLst>
-      <p:ext uri="{BB962C8B-B14F-4D97-AF65-F5344CB8AC3E}">
-        <p14:creationId xmlns:p14="http://schemas.microsoft.com/office/powerpoint/2010/main" val="2250559178"/>
       </p:ext>
     </p:extLst>
   </p:cSld>
@@ -14087,4 +14825,299 @@
     </a:ext>
   </a:extLst>
 </a:theme>
+</file>
+
+<file path=ppt/theme/theme2.xml><?xml version="1.0" encoding="utf-8"?>
+<a:theme xmlns:a="http://schemas.openxmlformats.org/drawingml/2006/main" name="Office Theme">
+  <a:themeElements>
+    <a:clrScheme name="Office">
+      <a:dk1>
+        <a:sysClr val="windowText" lastClr="000000"/>
+      </a:dk1>
+      <a:lt1>
+        <a:sysClr val="window" lastClr="FFFFFF"/>
+      </a:lt1>
+      <a:dk2>
+        <a:srgbClr val="44546A"/>
+      </a:dk2>
+      <a:lt2>
+        <a:srgbClr val="E7E6E6"/>
+      </a:lt2>
+      <a:accent1>
+        <a:srgbClr val="4472C4"/>
+      </a:accent1>
+      <a:accent2>
+        <a:srgbClr val="ED7D31"/>
+      </a:accent2>
+      <a:accent3>
+        <a:srgbClr val="A5A5A5"/>
+      </a:accent3>
+      <a:accent4>
+        <a:srgbClr val="FFC000"/>
+      </a:accent4>
+      <a:accent5>
+        <a:srgbClr val="5B9BD5"/>
+      </a:accent5>
+      <a:accent6>
+        <a:srgbClr val="70AD47"/>
+      </a:accent6>
+      <a:hlink>
+        <a:srgbClr val="0563C1"/>
+      </a:hlink>
+      <a:folHlink>
+        <a:srgbClr val="954F72"/>
+      </a:folHlink>
+    </a:clrScheme>
+    <a:fontScheme name="Office">
+      <a:majorFont>
+        <a:latin typeface="Calibri Light" panose="020F0302020204030204"/>
+        <a:ea typeface=""/>
+        <a:cs typeface=""/>
+        <a:font script="Jpan" typeface="游ゴシック Light"/>
+        <a:font script="Hang" typeface="맑은 고딕"/>
+        <a:font script="Hans" typeface="等线 Light"/>
+        <a:font script="Hant" typeface="新細明體"/>
+        <a:font script="Arab" typeface="Times New Roman"/>
+        <a:font script="Hebr" typeface="Times New Roman"/>
+        <a:font script="Thai" typeface="Angsana New"/>
+        <a:font script="Ethi" typeface="Nyala"/>
+        <a:font script="Beng" typeface="Vrinda"/>
+        <a:font script="Gujr" typeface="Shruti"/>
+        <a:font script="Khmr" typeface="MoolBoran"/>
+        <a:font script="Knda" typeface="Tunga"/>
+        <a:font script="Guru" typeface="Raavi"/>
+        <a:font script="Cans" typeface="Euphemia"/>
+        <a:font script="Cher" typeface="Plantagenet Cherokee"/>
+        <a:font script="Yiii" typeface="Microsoft Yi Baiti"/>
+        <a:font script="Tibt" typeface="Microsoft Himalaya"/>
+        <a:font script="Thaa" typeface="MV Boli"/>
+        <a:font script="Deva" typeface="Mangal"/>
+        <a:font script="Telu" typeface="Gautami"/>
+        <a:font script="Taml" typeface="Latha"/>
+        <a:font script="Syrc" typeface="Estrangelo Edessa"/>
+        <a:font script="Orya" typeface="Kalinga"/>
+        <a:font script="Mlym" typeface="Kartika"/>
+        <a:font script="Laoo" typeface="DokChampa"/>
+        <a:font script="Sinh" typeface="Iskoola Pota"/>
+        <a:font script="Mong" typeface="Mongolian Baiti"/>
+        <a:font script="Viet" typeface="Times New Roman"/>
+        <a:font script="Uigh" typeface="Microsoft Uighur"/>
+        <a:font script="Geor" typeface="Sylfaen"/>
+        <a:font script="Armn" typeface="Arial"/>
+        <a:font script="Bugi" typeface="Leelawadee UI"/>
+        <a:font script="Bopo" typeface="Microsoft JhengHei"/>
+        <a:font script="Java" typeface="Javanese Text"/>
+        <a:font script="Lisu" typeface="Segoe UI"/>
+        <a:font script="Mymr" typeface="Myanmar Text"/>
+        <a:font script="Nkoo" typeface="Ebrima"/>
+        <a:font script="Olck" typeface="Nirmala UI"/>
+        <a:font script="Osma" typeface="Ebrima"/>
+        <a:font script="Phag" typeface="Phagspa"/>
+        <a:font script="Syrn" typeface="Estrangelo Edessa"/>
+        <a:font script="Syrj" typeface="Estrangelo Edessa"/>
+        <a:font script="Syre" typeface="Estrangelo Edessa"/>
+        <a:font script="Sora" typeface="Nirmala UI"/>
+        <a:font script="Tale" typeface="Microsoft Tai Le"/>
+        <a:font script="Talu" typeface="Microsoft New Tai Lue"/>
+        <a:font script="Tfng" typeface="Ebrima"/>
+      </a:majorFont>
+      <a:minorFont>
+        <a:latin typeface="Calibri" panose="020F0502020204030204"/>
+        <a:ea typeface=""/>
+        <a:cs typeface=""/>
+        <a:font script="Jpan" typeface="游ゴシック"/>
+        <a:font script="Hang" typeface="맑은 고딕"/>
+        <a:font script="Hans" typeface="等线"/>
+        <a:font script="Hant" typeface="新細明體"/>
+        <a:font script="Arab" typeface="Arial"/>
+        <a:font script="Hebr" typeface="Arial"/>
+        <a:font script="Thai" typeface="Cordia New"/>
+        <a:font script="Ethi" typeface="Nyala"/>
+        <a:font script="Beng" typeface="Vrinda"/>
+        <a:font script="Gujr" typeface="Shruti"/>
+        <a:font script="Khmr" typeface="DaunPenh"/>
+        <a:font script="Knda" typeface="Tunga"/>
+        <a:font script="Guru" typeface="Raavi"/>
+        <a:font script="Cans" typeface="Euphemia"/>
+        <a:font script="Cher" typeface="Plantagenet Cherokee"/>
+        <a:font script="Yiii" typeface="Microsoft Yi Baiti"/>
+        <a:font script="Tibt" typeface="Microsoft Himalaya"/>
+        <a:font script="Thaa" typeface="MV Boli"/>
+        <a:font script="Deva" typeface="Mangal"/>
+        <a:font script="Telu" typeface="Gautami"/>
+        <a:font script="Taml" typeface="Latha"/>
+        <a:font script="Syrc" typeface="Estrangelo Edessa"/>
+        <a:font script="Orya" typeface="Kalinga"/>
+        <a:font script="Mlym" typeface="Kartika"/>
+        <a:font script="Laoo" typeface="DokChampa"/>
+        <a:font script="Sinh" typeface="Iskoola Pota"/>
+        <a:font script="Mong" typeface="Mongolian Baiti"/>
+        <a:font script="Viet" typeface="Arial"/>
+        <a:font script="Uigh" typeface="Microsoft Uighur"/>
+        <a:font script="Geor" typeface="Sylfaen"/>
+        <a:font script="Armn" typeface="Arial"/>
+        <a:font script="Bugi" typeface="Leelawadee UI"/>
+        <a:font script="Bopo" typeface="Microsoft JhengHei"/>
+        <a:font script="Java" typeface="Javanese Text"/>
+        <a:font script="Lisu" typeface="Segoe UI"/>
+        <a:font script="Mymr" typeface="Myanmar Text"/>
+        <a:font script="Nkoo" typeface="Ebrima"/>
+        <a:font script="Olck" typeface="Nirmala UI"/>
+        <a:font script="Osma" typeface="Ebrima"/>
+        <a:font script="Phag" typeface="Phagspa"/>
+        <a:font script="Syrn" typeface="Estrangelo Edessa"/>
+        <a:font script="Syrj" typeface="Estrangelo Edessa"/>
+        <a:font script="Syre" typeface="Estrangelo Edessa"/>
+        <a:font script="Sora" typeface="Nirmala UI"/>
+        <a:font script="Tale" typeface="Microsoft Tai Le"/>
+        <a:font script="Talu" typeface="Microsoft New Tai Lue"/>
+        <a:font script="Tfng" typeface="Ebrima"/>
+      </a:minorFont>
+    </a:fontScheme>
+    <a:fmtScheme name="Office">
+      <a:fillStyleLst>
+        <a:solidFill>
+          <a:schemeClr val="phClr"/>
+        </a:solidFill>
+        <a:gradFill rotWithShape="1">
+          <a:gsLst>
+            <a:gs pos="0">
+              <a:schemeClr val="phClr">
+                <a:lumMod val="110000"/>
+                <a:satMod val="105000"/>
+                <a:tint val="67000"/>
+              </a:schemeClr>
+            </a:gs>
+            <a:gs pos="50000">
+              <a:schemeClr val="phClr">
+                <a:lumMod val="105000"/>
+                <a:satMod val="103000"/>
+                <a:tint val="73000"/>
+              </a:schemeClr>
+            </a:gs>
+            <a:gs pos="100000">
+              <a:schemeClr val="phClr">
+                <a:lumMod val="105000"/>
+                <a:satMod val="109000"/>
+                <a:tint val="81000"/>
+              </a:schemeClr>
+            </a:gs>
+          </a:gsLst>
+          <a:lin ang="5400000" scaled="0"/>
+        </a:gradFill>
+        <a:gradFill rotWithShape="1">
+          <a:gsLst>
+            <a:gs pos="0">
+              <a:schemeClr val="phClr">
+                <a:satMod val="103000"/>
+                <a:lumMod val="102000"/>
+                <a:tint val="94000"/>
+              </a:schemeClr>
+            </a:gs>
+            <a:gs pos="50000">
+              <a:schemeClr val="phClr">
+                <a:satMod val="110000"/>
+                <a:lumMod val="100000"/>
+                <a:shade val="100000"/>
+              </a:schemeClr>
+            </a:gs>
+            <a:gs pos="100000">
+              <a:schemeClr val="phClr">
+                <a:lumMod val="99000"/>
+                <a:satMod val="120000"/>
+                <a:shade val="78000"/>
+              </a:schemeClr>
+            </a:gs>
+          </a:gsLst>
+          <a:lin ang="5400000" scaled="0"/>
+        </a:gradFill>
+      </a:fillStyleLst>
+      <a:lnStyleLst>
+        <a:ln w="6350" cap="flat" cmpd="sng" algn="ctr">
+          <a:solidFill>
+            <a:schemeClr val="phClr"/>
+          </a:solidFill>
+          <a:prstDash val="solid"/>
+          <a:miter lim="800000"/>
+        </a:ln>
+        <a:ln w="12700" cap="flat" cmpd="sng" algn="ctr">
+          <a:solidFill>
+            <a:schemeClr val="phClr"/>
+          </a:solidFill>
+          <a:prstDash val="solid"/>
+          <a:miter lim="800000"/>
+        </a:ln>
+        <a:ln w="19050" cap="flat" cmpd="sng" algn="ctr">
+          <a:solidFill>
+            <a:schemeClr val="phClr"/>
+          </a:solidFill>
+          <a:prstDash val="solid"/>
+          <a:miter lim="800000"/>
+        </a:ln>
+      </a:lnStyleLst>
+      <a:effectStyleLst>
+        <a:effectStyle>
+          <a:effectLst/>
+        </a:effectStyle>
+        <a:effectStyle>
+          <a:effectLst/>
+        </a:effectStyle>
+        <a:effectStyle>
+          <a:effectLst>
+            <a:outerShdw blurRad="57150" dist="19050" dir="5400000" algn="ctr" rotWithShape="0">
+              <a:srgbClr val="000000">
+                <a:alpha val="63000"/>
+              </a:srgbClr>
+            </a:outerShdw>
+          </a:effectLst>
+        </a:effectStyle>
+      </a:effectStyleLst>
+      <a:bgFillStyleLst>
+        <a:solidFill>
+          <a:schemeClr val="phClr"/>
+        </a:solidFill>
+        <a:solidFill>
+          <a:schemeClr val="phClr">
+            <a:tint val="95000"/>
+            <a:satMod val="170000"/>
+          </a:schemeClr>
+        </a:solidFill>
+        <a:gradFill rotWithShape="1">
+          <a:gsLst>
+            <a:gs pos="0">
+              <a:schemeClr val="phClr">
+                <a:tint val="93000"/>
+                <a:satMod val="150000"/>
+                <a:shade val="98000"/>
+                <a:lumMod val="102000"/>
+              </a:schemeClr>
+            </a:gs>
+            <a:gs pos="50000">
+              <a:schemeClr val="phClr">
+                <a:tint val="98000"/>
+                <a:satMod val="130000"/>
+                <a:shade val="90000"/>
+                <a:lumMod val="103000"/>
+              </a:schemeClr>
+            </a:gs>
+            <a:gs pos="100000">
+              <a:schemeClr val="phClr">
+                <a:shade val="63000"/>
+                <a:satMod val="120000"/>
+              </a:schemeClr>
+            </a:gs>
+          </a:gsLst>
+          <a:lin ang="5400000" scaled="0"/>
+        </a:gradFill>
+      </a:bgFillStyleLst>
+    </a:fmtScheme>
+  </a:themeElements>
+  <a:objectDefaults/>
+  <a:extraClrSchemeLst/>
+  <a:extLst>
+    <a:ext uri="{05A4C25C-085E-4340-85A3-A5531E510DB2}">
+      <thm15:themeFamily xmlns:thm15="http://schemas.microsoft.com/office/thememl/2012/main" name="Office Theme" id="{62F939B6-93AF-4DB8-9C6B-D6C7DFDC589F}" vid="{4A3C46E8-61CC-4603-A589-7422A47A8E4A}"/>
+    </a:ext>
+  </a:extLst>
+</a:theme>
 </file>
</xml_diff>